<commit_message>
Initial python trainees commit
</commit_message>
<xml_diff>
--- a/python_engineers/part_2/python_data_engineers_2.pptx
+++ b/python_engineers/part_2/python_data_engineers_2.pptx
@@ -37,8 +37,6 @@
     <p:sldId id="325" r:id="rId31"/>
     <p:sldId id="322" r:id="rId32"/>
     <p:sldId id="261" r:id="rId33"/>
-    <p:sldId id="301" r:id="rId34"/>
-    <p:sldId id="295" r:id="rId35"/>
   </p:sldIdLst>
   <p:sldSz cx="12192000" cy="6858000"/>
   <p:notesSz cx="6858000" cy="9144000"/>
@@ -306,7 +304,7 @@
           <a:p>
             <a:fld id="{0EBB069A-003F-4FC0-8534-236B0C5C7B5F}" type="datetimeFigureOut">
               <a:rPr lang="en-NL" smtClean="0"/>
-              <a:t>13/12/2022</a:t>
+              <a:t>07/02/2023</a:t>
             </a:fld>
             <a:endParaRPr lang="en-NL"/>
           </a:p>
@@ -506,7 +504,7 @@
           <a:p>
             <a:fld id="{0EBB069A-003F-4FC0-8534-236B0C5C7B5F}" type="datetimeFigureOut">
               <a:rPr lang="en-NL" smtClean="0"/>
-              <a:t>13/12/2022</a:t>
+              <a:t>07/02/2023</a:t>
             </a:fld>
             <a:endParaRPr lang="en-NL"/>
           </a:p>
@@ -716,7 +714,7 @@
           <a:p>
             <a:fld id="{0EBB069A-003F-4FC0-8534-236B0C5C7B5F}" type="datetimeFigureOut">
               <a:rPr lang="en-NL" smtClean="0"/>
-              <a:t>13/12/2022</a:t>
+              <a:t>07/02/2023</a:t>
             </a:fld>
             <a:endParaRPr lang="en-NL"/>
           </a:p>
@@ -916,7 +914,7 @@
           <a:p>
             <a:fld id="{0EBB069A-003F-4FC0-8534-236B0C5C7B5F}" type="datetimeFigureOut">
               <a:rPr lang="en-NL" smtClean="0"/>
-              <a:t>13/12/2022</a:t>
+              <a:t>07/02/2023</a:t>
             </a:fld>
             <a:endParaRPr lang="en-NL"/>
           </a:p>
@@ -1192,7 +1190,7 @@
           <a:p>
             <a:fld id="{0EBB069A-003F-4FC0-8534-236B0C5C7B5F}" type="datetimeFigureOut">
               <a:rPr lang="en-NL" smtClean="0"/>
-              <a:t>13/12/2022</a:t>
+              <a:t>07/02/2023</a:t>
             </a:fld>
             <a:endParaRPr lang="en-NL"/>
           </a:p>
@@ -1460,7 +1458,7 @@
           <a:p>
             <a:fld id="{0EBB069A-003F-4FC0-8534-236B0C5C7B5F}" type="datetimeFigureOut">
               <a:rPr lang="en-NL" smtClean="0"/>
-              <a:t>13/12/2022</a:t>
+              <a:t>07/02/2023</a:t>
             </a:fld>
             <a:endParaRPr lang="en-NL"/>
           </a:p>
@@ -1875,7 +1873,7 @@
           <a:p>
             <a:fld id="{0EBB069A-003F-4FC0-8534-236B0C5C7B5F}" type="datetimeFigureOut">
               <a:rPr lang="en-NL" smtClean="0"/>
-              <a:t>13/12/2022</a:t>
+              <a:t>07/02/2023</a:t>
             </a:fld>
             <a:endParaRPr lang="en-NL"/>
           </a:p>
@@ -2017,7 +2015,7 @@
           <a:p>
             <a:fld id="{0EBB069A-003F-4FC0-8534-236B0C5C7B5F}" type="datetimeFigureOut">
               <a:rPr lang="en-NL" smtClean="0"/>
-              <a:t>13/12/2022</a:t>
+              <a:t>07/02/2023</a:t>
             </a:fld>
             <a:endParaRPr lang="en-NL"/>
           </a:p>
@@ -2130,7 +2128,7 @@
           <a:p>
             <a:fld id="{0EBB069A-003F-4FC0-8534-236B0C5C7B5F}" type="datetimeFigureOut">
               <a:rPr lang="en-NL" smtClean="0"/>
-              <a:t>13/12/2022</a:t>
+              <a:t>07/02/2023</a:t>
             </a:fld>
             <a:endParaRPr lang="en-NL"/>
           </a:p>
@@ -2443,7 +2441,7 @@
           <a:p>
             <a:fld id="{0EBB069A-003F-4FC0-8534-236B0C5C7B5F}" type="datetimeFigureOut">
               <a:rPr lang="en-NL" smtClean="0"/>
-              <a:t>13/12/2022</a:t>
+              <a:t>07/02/2023</a:t>
             </a:fld>
             <a:endParaRPr lang="en-NL"/>
           </a:p>
@@ -2732,7 +2730,7 @@
           <a:p>
             <a:fld id="{0EBB069A-003F-4FC0-8534-236B0C5C7B5F}" type="datetimeFigureOut">
               <a:rPr lang="en-NL" smtClean="0"/>
-              <a:t>13/12/2022</a:t>
+              <a:t>07/02/2023</a:t>
             </a:fld>
             <a:endParaRPr lang="en-NL"/>
           </a:p>
@@ -2975,7 +2973,7 @@
           <a:p>
             <a:fld id="{0EBB069A-003F-4FC0-8534-236B0C5C7B5F}" type="datetimeFigureOut">
               <a:rPr lang="en-NL" smtClean="0"/>
-              <a:t>13/12/2022</a:t>
+              <a:t>07/02/2023</a:t>
             </a:fld>
             <a:endParaRPr lang="en-NL"/>
           </a:p>
@@ -18621,882 +18619,6 @@
 </p:sld>
 </file>
 
-<file path=ppt/slides/slide33.xml><?xml version="1.0" encoding="utf-8"?>
-<p:sld xmlns:a="http://schemas.openxmlformats.org/drawingml/2006/main" xmlns:r="http://schemas.openxmlformats.org/officeDocument/2006/relationships" xmlns:p="http://schemas.openxmlformats.org/presentationml/2006/main">
-  <p:cSld>
-    <p:spTree>
-      <p:nvGrpSpPr>
-        <p:cNvPr id="1" name=""/>
-        <p:cNvGrpSpPr/>
-        <p:nvPr/>
-      </p:nvGrpSpPr>
-      <p:grpSpPr>
-        <a:xfrm>
-          <a:off x="0" y="0"/>
-          <a:ext cx="0" cy="0"/>
-          <a:chOff x="0" y="0"/>
-          <a:chExt cx="0" cy="0"/>
-        </a:xfrm>
-      </p:grpSpPr>
-      <p:sp>
-        <p:nvSpPr>
-          <p:cNvPr id="2" name="Title 1">
-            <a:extLst>
-              <a:ext uri="{FF2B5EF4-FFF2-40B4-BE49-F238E27FC236}">
-                <a16:creationId xmlns:a16="http://schemas.microsoft.com/office/drawing/2014/main" id="{39A1D606-8DD1-369C-5C09-471CDD551AD5}"/>
-              </a:ext>
-            </a:extLst>
-          </p:cNvPr>
-          <p:cNvSpPr>
-            <a:spLocks noGrp="1"/>
-          </p:cNvSpPr>
-          <p:nvPr>
-            <p:ph type="title"/>
-          </p:nvPr>
-        </p:nvSpPr>
-        <p:spPr>
-          <a:xfrm>
-            <a:off x="838200" y="365126"/>
-            <a:ext cx="10515600" cy="718608"/>
-          </a:xfrm>
-        </p:spPr>
-        <p:txBody>
-          <a:bodyPr>
-            <a:normAutofit/>
-          </a:bodyPr>
-          <a:lstStyle/>
-          <a:p>
-            <a:r>
-              <a:rPr lang="nl-NL" sz="3600" noProof="0" dirty="0"/>
-              <a:t>Overerving</a:t>
-            </a:r>
-          </a:p>
-        </p:txBody>
-      </p:sp>
-      <p:sp>
-        <p:nvSpPr>
-          <p:cNvPr id="8" name="Rectangle 7">
-            <a:extLst>
-              <a:ext uri="{FF2B5EF4-FFF2-40B4-BE49-F238E27FC236}">
-                <a16:creationId xmlns:a16="http://schemas.microsoft.com/office/drawing/2014/main" id="{8F8A90BB-468A-6D0A-002C-262602B18B4B}"/>
-              </a:ext>
-            </a:extLst>
-          </p:cNvPr>
-          <p:cNvSpPr/>
-          <p:nvPr/>
-        </p:nvSpPr>
-        <p:spPr>
-          <a:xfrm>
-            <a:off x="5262034" y="804334"/>
-            <a:ext cx="1667933" cy="982134"/>
-          </a:xfrm>
-          <a:prstGeom prst="rect">
-            <a:avLst/>
-          </a:prstGeom>
-        </p:spPr>
-        <p:style>
-          <a:lnRef idx="1">
-            <a:schemeClr val="accent4"/>
-          </a:lnRef>
-          <a:fillRef idx="2">
-            <a:schemeClr val="accent4"/>
-          </a:fillRef>
-          <a:effectRef idx="1">
-            <a:schemeClr val="accent4"/>
-          </a:effectRef>
-          <a:fontRef idx="minor">
-            <a:schemeClr val="dk1"/>
-          </a:fontRef>
-        </p:style>
-        <p:txBody>
-          <a:bodyPr rtlCol="0" anchor="ctr"/>
-          <a:lstStyle/>
-          <a:p>
-            <a:pPr algn="ctr"/>
-            <a:r>
-              <a:rPr lang="nl-NL" dirty="0"/>
-              <a:t>Voertuig</a:t>
-            </a:r>
-          </a:p>
-        </p:txBody>
-      </p:sp>
-      <p:sp>
-        <p:nvSpPr>
-          <p:cNvPr id="9" name="Rectangle 8">
-            <a:extLst>
-              <a:ext uri="{FF2B5EF4-FFF2-40B4-BE49-F238E27FC236}">
-                <a16:creationId xmlns:a16="http://schemas.microsoft.com/office/drawing/2014/main" id="{4F0F36A3-E63F-438C-664E-6CCFFF26537D}"/>
-              </a:ext>
-            </a:extLst>
-          </p:cNvPr>
-          <p:cNvSpPr/>
-          <p:nvPr/>
-        </p:nvSpPr>
-        <p:spPr>
-          <a:xfrm>
-            <a:off x="3050117" y="2704572"/>
-            <a:ext cx="1667933" cy="982134"/>
-          </a:xfrm>
-          <a:prstGeom prst="rect">
-            <a:avLst/>
-          </a:prstGeom>
-        </p:spPr>
-        <p:style>
-          <a:lnRef idx="1">
-            <a:schemeClr val="accent5"/>
-          </a:lnRef>
-          <a:fillRef idx="2">
-            <a:schemeClr val="accent5"/>
-          </a:fillRef>
-          <a:effectRef idx="1">
-            <a:schemeClr val="accent5"/>
-          </a:effectRef>
-          <a:fontRef idx="minor">
-            <a:schemeClr val="dk1"/>
-          </a:fontRef>
-        </p:style>
-        <p:txBody>
-          <a:bodyPr rtlCol="0" anchor="ctr"/>
-          <a:lstStyle/>
-          <a:p>
-            <a:pPr algn="ctr"/>
-            <a:r>
-              <a:rPr lang="nl-NL" dirty="0"/>
-              <a:t>Auto</a:t>
-            </a:r>
-          </a:p>
-        </p:txBody>
-      </p:sp>
-      <p:sp>
-        <p:nvSpPr>
-          <p:cNvPr id="10" name="Rectangle 9">
-            <a:extLst>
-              <a:ext uri="{FF2B5EF4-FFF2-40B4-BE49-F238E27FC236}">
-                <a16:creationId xmlns:a16="http://schemas.microsoft.com/office/drawing/2014/main" id="{4176E6D8-DC0A-C2D6-09E4-B96454281B96}"/>
-              </a:ext>
-            </a:extLst>
-          </p:cNvPr>
-          <p:cNvSpPr/>
-          <p:nvPr/>
-        </p:nvSpPr>
-        <p:spPr>
-          <a:xfrm>
-            <a:off x="838200" y="2723358"/>
-            <a:ext cx="1667933" cy="982134"/>
-          </a:xfrm>
-          <a:prstGeom prst="rect">
-            <a:avLst/>
-          </a:prstGeom>
-        </p:spPr>
-        <p:style>
-          <a:lnRef idx="1">
-            <a:schemeClr val="accent6"/>
-          </a:lnRef>
-          <a:fillRef idx="2">
-            <a:schemeClr val="accent6"/>
-          </a:fillRef>
-          <a:effectRef idx="1">
-            <a:schemeClr val="accent6"/>
-          </a:effectRef>
-          <a:fontRef idx="minor">
-            <a:schemeClr val="dk1"/>
-          </a:fontRef>
-        </p:style>
-        <p:txBody>
-          <a:bodyPr rtlCol="0" anchor="ctr"/>
-          <a:lstStyle/>
-          <a:p>
-            <a:pPr algn="ctr"/>
-            <a:r>
-              <a:rPr lang="nl-NL" dirty="0"/>
-              <a:t>Vrachtwagen</a:t>
-            </a:r>
-          </a:p>
-        </p:txBody>
-      </p:sp>
-      <p:sp>
-        <p:nvSpPr>
-          <p:cNvPr id="11" name="Rectangle 10">
-            <a:extLst>
-              <a:ext uri="{FF2B5EF4-FFF2-40B4-BE49-F238E27FC236}">
-                <a16:creationId xmlns:a16="http://schemas.microsoft.com/office/drawing/2014/main" id="{B0FD3C67-D8CC-C794-10C4-88ED519F20DB}"/>
-              </a:ext>
-            </a:extLst>
-          </p:cNvPr>
-          <p:cNvSpPr/>
-          <p:nvPr/>
-        </p:nvSpPr>
-        <p:spPr>
-          <a:xfrm>
-            <a:off x="7473951" y="2704572"/>
-            <a:ext cx="1667933" cy="982134"/>
-          </a:xfrm>
-          <a:prstGeom prst="rect">
-            <a:avLst/>
-          </a:prstGeom>
-        </p:spPr>
-        <p:style>
-          <a:lnRef idx="1">
-            <a:schemeClr val="accent5"/>
-          </a:lnRef>
-          <a:fillRef idx="2">
-            <a:schemeClr val="accent5"/>
-          </a:fillRef>
-          <a:effectRef idx="1">
-            <a:schemeClr val="accent5"/>
-          </a:effectRef>
-          <a:fontRef idx="minor">
-            <a:schemeClr val="dk1"/>
-          </a:fontRef>
-        </p:style>
-        <p:txBody>
-          <a:bodyPr rtlCol="0" anchor="ctr"/>
-          <a:lstStyle/>
-          <a:p>
-            <a:pPr algn="ctr"/>
-            <a:r>
-              <a:rPr lang="nl-NL" dirty="0" err="1"/>
-              <a:t>ElektrischeFiets</a:t>
-            </a:r>
-            <a:endParaRPr lang="nl-NL" dirty="0"/>
-          </a:p>
-        </p:txBody>
-      </p:sp>
-      <p:sp>
-        <p:nvSpPr>
-          <p:cNvPr id="19" name="Rectangle 18">
-            <a:extLst>
-              <a:ext uri="{FF2B5EF4-FFF2-40B4-BE49-F238E27FC236}">
-                <a16:creationId xmlns:a16="http://schemas.microsoft.com/office/drawing/2014/main" id="{3177325D-D211-A5CE-6947-92EF15DD9D6B}"/>
-              </a:ext>
-            </a:extLst>
-          </p:cNvPr>
-          <p:cNvSpPr/>
-          <p:nvPr/>
-        </p:nvSpPr>
-        <p:spPr>
-          <a:xfrm>
-            <a:off x="9685867" y="2704572"/>
-            <a:ext cx="1667933" cy="982134"/>
-          </a:xfrm>
-          <a:prstGeom prst="rect">
-            <a:avLst/>
-          </a:prstGeom>
-        </p:spPr>
-        <p:style>
-          <a:lnRef idx="1">
-            <a:schemeClr val="accent5"/>
-          </a:lnRef>
-          <a:fillRef idx="2">
-            <a:schemeClr val="accent5"/>
-          </a:fillRef>
-          <a:effectRef idx="1">
-            <a:schemeClr val="accent5"/>
-          </a:effectRef>
-          <a:fontRef idx="minor">
-            <a:schemeClr val="dk1"/>
-          </a:fontRef>
-        </p:style>
-        <p:txBody>
-          <a:bodyPr rtlCol="0" anchor="ctr"/>
-          <a:lstStyle/>
-          <a:p>
-            <a:pPr algn="ctr"/>
-            <a:r>
-              <a:rPr lang="nl-NL" dirty="0"/>
-              <a:t>Fiets</a:t>
-            </a:r>
-          </a:p>
-        </p:txBody>
-      </p:sp>
-      <p:sp>
-        <p:nvSpPr>
-          <p:cNvPr id="21" name="Rectangle 20">
-            <a:extLst>
-              <a:ext uri="{FF2B5EF4-FFF2-40B4-BE49-F238E27FC236}">
-                <a16:creationId xmlns:a16="http://schemas.microsoft.com/office/drawing/2014/main" id="{B7A1F8AF-4F1D-615B-7649-D63D9A01F689}"/>
-              </a:ext>
-            </a:extLst>
-          </p:cNvPr>
-          <p:cNvSpPr/>
-          <p:nvPr/>
-        </p:nvSpPr>
-        <p:spPr>
-          <a:xfrm>
-            <a:off x="5262034" y="2704572"/>
-            <a:ext cx="1667933" cy="982134"/>
-          </a:xfrm>
-          <a:prstGeom prst="rect">
-            <a:avLst/>
-          </a:prstGeom>
-        </p:spPr>
-        <p:style>
-          <a:lnRef idx="1">
-            <a:schemeClr val="accent5"/>
-          </a:lnRef>
-          <a:fillRef idx="2">
-            <a:schemeClr val="accent5"/>
-          </a:fillRef>
-          <a:effectRef idx="1">
-            <a:schemeClr val="accent5"/>
-          </a:effectRef>
-          <a:fontRef idx="minor">
-            <a:schemeClr val="dk1"/>
-          </a:fontRef>
-        </p:style>
-        <p:txBody>
-          <a:bodyPr rtlCol="0" anchor="ctr"/>
-          <a:lstStyle/>
-          <a:p>
-            <a:pPr algn="ctr"/>
-            <a:r>
-              <a:rPr lang="nl-NL" dirty="0" err="1"/>
-              <a:t>ElektrischAuto</a:t>
-            </a:r>
-            <a:endParaRPr lang="nl-NL" dirty="0"/>
-          </a:p>
-        </p:txBody>
-      </p:sp>
-      <p:sp>
-        <p:nvSpPr>
-          <p:cNvPr id="3" name="Rectangle 2">
-            <a:extLst>
-              <a:ext uri="{FF2B5EF4-FFF2-40B4-BE49-F238E27FC236}">
-                <a16:creationId xmlns:a16="http://schemas.microsoft.com/office/drawing/2014/main" id="{70C0767A-2AB8-F5A3-9730-EC8D7875C54F}"/>
-              </a:ext>
-            </a:extLst>
-          </p:cNvPr>
-          <p:cNvSpPr/>
-          <p:nvPr/>
-        </p:nvSpPr>
-        <p:spPr>
-          <a:xfrm>
-            <a:off x="7473950" y="804334"/>
-            <a:ext cx="1667933" cy="982134"/>
-          </a:xfrm>
-          <a:prstGeom prst="rect">
-            <a:avLst/>
-          </a:prstGeom>
-        </p:spPr>
-        <p:style>
-          <a:lnRef idx="1">
-            <a:schemeClr val="accent4"/>
-          </a:lnRef>
-          <a:fillRef idx="2">
-            <a:schemeClr val="accent4"/>
-          </a:fillRef>
-          <a:effectRef idx="1">
-            <a:schemeClr val="accent4"/>
-          </a:effectRef>
-          <a:fontRef idx="minor">
-            <a:schemeClr val="dk1"/>
-          </a:fontRef>
-        </p:style>
-        <p:txBody>
-          <a:bodyPr rtlCol="0" anchor="ctr"/>
-          <a:lstStyle/>
-          <a:p>
-            <a:pPr algn="ctr"/>
-            <a:r>
-              <a:rPr lang="nl-NL" dirty="0" err="1"/>
-              <a:t>ElektrischMixin</a:t>
-            </a:r>
-            <a:endParaRPr lang="nl-NL" dirty="0"/>
-          </a:p>
-        </p:txBody>
-      </p:sp>
-    </p:spTree>
-    <p:extLst>
-      <p:ext uri="{BB962C8B-B14F-4D97-AF65-F5344CB8AC3E}">
-        <p14:creationId xmlns:p14="http://schemas.microsoft.com/office/powerpoint/2010/main" val="921584377"/>
-      </p:ext>
-    </p:extLst>
-  </p:cSld>
-  <p:clrMapOvr>
-    <a:masterClrMapping/>
-  </p:clrMapOvr>
-</p:sld>
-</file>
-
-<file path=ppt/slides/slide34.xml><?xml version="1.0" encoding="utf-8"?>
-<p:sld xmlns:a="http://schemas.openxmlformats.org/drawingml/2006/main" xmlns:r="http://schemas.openxmlformats.org/officeDocument/2006/relationships" xmlns:p="http://schemas.openxmlformats.org/presentationml/2006/main">
-  <p:cSld>
-    <p:spTree>
-      <p:nvGrpSpPr>
-        <p:cNvPr id="1" name=""/>
-        <p:cNvGrpSpPr/>
-        <p:nvPr/>
-      </p:nvGrpSpPr>
-      <p:grpSpPr>
-        <a:xfrm>
-          <a:off x="0" y="0"/>
-          <a:ext cx="0" cy="0"/>
-          <a:chOff x="0" y="0"/>
-          <a:chExt cx="0" cy="0"/>
-        </a:xfrm>
-      </p:grpSpPr>
-      <p:sp>
-        <p:nvSpPr>
-          <p:cNvPr id="2" name="Title 1">
-            <a:extLst>
-              <a:ext uri="{FF2B5EF4-FFF2-40B4-BE49-F238E27FC236}">
-                <a16:creationId xmlns:a16="http://schemas.microsoft.com/office/drawing/2014/main" id="{39A1D606-8DD1-369C-5C09-471CDD551AD5}"/>
-              </a:ext>
-            </a:extLst>
-          </p:cNvPr>
-          <p:cNvSpPr>
-            <a:spLocks noGrp="1"/>
-          </p:cNvSpPr>
-          <p:nvPr>
-            <p:ph type="title"/>
-          </p:nvPr>
-        </p:nvSpPr>
-        <p:spPr>
-          <a:xfrm>
-            <a:off x="838200" y="365126"/>
-            <a:ext cx="10515600" cy="718608"/>
-          </a:xfrm>
-        </p:spPr>
-        <p:txBody>
-          <a:bodyPr>
-            <a:normAutofit/>
-          </a:bodyPr>
-          <a:lstStyle/>
-          <a:p>
-            <a:r>
-              <a:rPr lang="nl-NL" sz="3600" noProof="0" dirty="0"/>
-              <a:t>Oefening</a:t>
-            </a:r>
-          </a:p>
-        </p:txBody>
-      </p:sp>
-      <p:sp>
-        <p:nvSpPr>
-          <p:cNvPr id="3" name="Content Placeholder 2">
-            <a:extLst>
-              <a:ext uri="{FF2B5EF4-FFF2-40B4-BE49-F238E27FC236}">
-                <a16:creationId xmlns:a16="http://schemas.microsoft.com/office/drawing/2014/main" id="{F4C2D286-E049-0AAB-1360-B7157E11AD7E}"/>
-              </a:ext>
-            </a:extLst>
-          </p:cNvPr>
-          <p:cNvSpPr>
-            <a:spLocks noGrp="1"/>
-          </p:cNvSpPr>
-          <p:nvPr>
-            <p:ph idx="1"/>
-          </p:nvPr>
-        </p:nvSpPr>
-        <p:spPr>
-          <a:xfrm>
-            <a:off x="838200" y="1456267"/>
-            <a:ext cx="6514322" cy="4720696"/>
-          </a:xfrm>
-        </p:spPr>
-        <p:txBody>
-          <a:bodyPr>
-            <a:normAutofit/>
-          </a:bodyPr>
-          <a:lstStyle/>
-          <a:p>
-            <a:pPr marL="0" indent="0">
-              <a:buNone/>
-            </a:pPr>
-            <a:r>
-              <a:rPr lang="nl-NL" sz="2000" b="1" noProof="0" dirty="0"/>
-              <a:t>Schrijf een script dat:</a:t>
-            </a:r>
-          </a:p>
-          <a:p>
-            <a:pPr marL="0" indent="0">
-              <a:buNone/>
-            </a:pPr>
-            <a:endParaRPr lang="nl-NL" sz="2000" b="1" noProof="0" dirty="0"/>
-          </a:p>
-          <a:p>
-            <a:pPr marL="457200" indent="-457200">
-              <a:buAutoNum type="arabicPeriod"/>
-            </a:pPr>
-            <a:r>
-              <a:rPr lang="nl-NL" sz="2000" noProof="0" dirty="0"/>
-              <a:t>Een CSV-bestand inleest en verwerkt.</a:t>
-            </a:r>
-          </a:p>
-          <a:p>
-            <a:pPr marL="457200" indent="-457200">
-              <a:buAutoNum type="arabicPeriod"/>
-            </a:pPr>
-            <a:r>
-              <a:rPr lang="nl-NL" sz="2000" noProof="0" dirty="0"/>
-              <a:t>Voor elk persoon de faculteit van de leeftijd berekent.</a:t>
-            </a:r>
-          </a:p>
-          <a:p>
-            <a:pPr marL="457200" indent="-457200">
-              <a:buAutoNum type="arabicPeriod"/>
-            </a:pPr>
-            <a:r>
-              <a:rPr lang="nl-NL" sz="2000" noProof="0" dirty="0"/>
-              <a:t>De resultaten wegschrijft naar een nieuw CSV-bestand.</a:t>
-            </a:r>
-          </a:p>
-          <a:p>
-            <a:pPr marL="0" indent="0">
-              <a:buNone/>
-            </a:pPr>
-            <a:endParaRPr lang="nl-NL" sz="2000" noProof="0" dirty="0"/>
-          </a:p>
-          <a:p>
-            <a:pPr marL="0" indent="0">
-              <a:buNone/>
-            </a:pPr>
-            <a:r>
-              <a:rPr lang="nl-NL" sz="2000" b="1" noProof="0" dirty="0"/>
-              <a:t>Bonuspunten:</a:t>
-            </a:r>
-          </a:p>
-          <a:p>
-            <a:pPr>
-              <a:buFontTx/>
-              <a:buChar char="-"/>
-            </a:pPr>
-            <a:endParaRPr lang="nl-NL" sz="2000" noProof="0" dirty="0"/>
-          </a:p>
-          <a:p>
-            <a:pPr>
-              <a:buFontTx/>
-              <a:buChar char="-"/>
-            </a:pPr>
-            <a:r>
-              <a:rPr lang="nl-NL" sz="2000" noProof="0" dirty="0"/>
-              <a:t>Zorg voor een nette structuur (opdelen functies).</a:t>
-            </a:r>
-          </a:p>
-          <a:p>
-            <a:pPr>
-              <a:buFontTx/>
-              <a:buChar char="-"/>
-            </a:pPr>
-            <a:r>
-              <a:rPr lang="nl-NL" sz="2000" noProof="0" dirty="0"/>
-              <a:t>Maak goede documentatie.</a:t>
-            </a:r>
-          </a:p>
-          <a:p>
-            <a:pPr>
-              <a:buFontTx/>
-              <a:buChar char="-"/>
-            </a:pPr>
-            <a:r>
-              <a:rPr lang="nl-NL" sz="2000" noProof="0" dirty="0"/>
-              <a:t>Zorg voor </a:t>
-            </a:r>
-            <a:r>
-              <a:rPr lang="nl-NL" sz="2000" noProof="0" dirty="0" err="1"/>
-              <a:t>logging</a:t>
-            </a:r>
-            <a:r>
-              <a:rPr lang="nl-NL" sz="2000" noProof="0" dirty="0"/>
-              <a:t> naar de terminal.</a:t>
-            </a:r>
-          </a:p>
-        </p:txBody>
-      </p:sp>
-      <p:sp>
-        <p:nvSpPr>
-          <p:cNvPr id="4" name="Content Placeholder 2">
-            <a:extLst>
-              <a:ext uri="{FF2B5EF4-FFF2-40B4-BE49-F238E27FC236}">
-                <a16:creationId xmlns:a16="http://schemas.microsoft.com/office/drawing/2014/main" id="{57E940DA-5AAD-D002-6F9A-E2FF312E3A6C}"/>
-              </a:ext>
-            </a:extLst>
-          </p:cNvPr>
-          <p:cNvSpPr txBox="1">
-            <a:spLocks/>
-          </p:cNvSpPr>
-          <p:nvPr/>
-        </p:nvSpPr>
-        <p:spPr>
-          <a:xfrm>
-            <a:off x="8248260" y="1456267"/>
-            <a:ext cx="2820955" cy="4720696"/>
-          </a:xfrm>
-          <a:prstGeom prst="rect">
-            <a:avLst/>
-          </a:prstGeom>
-        </p:spPr>
-        <p:txBody>
-          <a:bodyPr vert="horz" lIns="91440" tIns="45720" rIns="91440" bIns="45720" rtlCol="0">
-            <a:normAutofit/>
-          </a:bodyPr>
-          <a:lstStyle>
-            <a:lvl1pPr marL="228600" indent="-228600" algn="l" defTabSz="914400" rtl="0" eaLnBrk="1" latinLnBrk="0" hangingPunct="1">
-              <a:lnSpc>
-                <a:spcPct val="90000"/>
-              </a:lnSpc>
-              <a:spcBef>
-                <a:spcPts val="1000"/>
-              </a:spcBef>
-              <a:buFont typeface="Arial" panose="020B0604020202020204" pitchFamily="34" charset="0"/>
-              <a:buChar char="•"/>
-              <a:defRPr sz="2800" kern="1200">
-                <a:solidFill>
-                  <a:schemeClr val="tx1"/>
-                </a:solidFill>
-                <a:latin typeface="+mn-lt"/>
-                <a:ea typeface="+mn-ea"/>
-                <a:cs typeface="+mn-cs"/>
-              </a:defRPr>
-            </a:lvl1pPr>
-            <a:lvl2pPr marL="685800" indent="-228600" algn="l" defTabSz="914400" rtl="0" eaLnBrk="1" latinLnBrk="0" hangingPunct="1">
-              <a:lnSpc>
-                <a:spcPct val="90000"/>
-              </a:lnSpc>
-              <a:spcBef>
-                <a:spcPts val="500"/>
-              </a:spcBef>
-              <a:buFont typeface="Arial" panose="020B0604020202020204" pitchFamily="34" charset="0"/>
-              <a:buChar char="•"/>
-              <a:defRPr sz="2400" kern="1200">
-                <a:solidFill>
-                  <a:schemeClr val="tx1"/>
-                </a:solidFill>
-                <a:latin typeface="+mn-lt"/>
-                <a:ea typeface="+mn-ea"/>
-                <a:cs typeface="+mn-cs"/>
-              </a:defRPr>
-            </a:lvl2pPr>
-            <a:lvl3pPr marL="1143000" indent="-228600" algn="l" defTabSz="914400" rtl="0" eaLnBrk="1" latinLnBrk="0" hangingPunct="1">
-              <a:lnSpc>
-                <a:spcPct val="90000"/>
-              </a:lnSpc>
-              <a:spcBef>
-                <a:spcPts val="500"/>
-              </a:spcBef>
-              <a:buFont typeface="Arial" panose="020B0604020202020204" pitchFamily="34" charset="0"/>
-              <a:buChar char="•"/>
-              <a:defRPr sz="2000" kern="1200">
-                <a:solidFill>
-                  <a:schemeClr val="tx1"/>
-                </a:solidFill>
-                <a:latin typeface="+mn-lt"/>
-                <a:ea typeface="+mn-ea"/>
-                <a:cs typeface="+mn-cs"/>
-              </a:defRPr>
-            </a:lvl3pPr>
-            <a:lvl4pPr marL="1600200" indent="-228600" algn="l" defTabSz="914400" rtl="0" eaLnBrk="1" latinLnBrk="0" hangingPunct="1">
-              <a:lnSpc>
-                <a:spcPct val="90000"/>
-              </a:lnSpc>
-              <a:spcBef>
-                <a:spcPts val="500"/>
-              </a:spcBef>
-              <a:buFont typeface="Arial" panose="020B0604020202020204" pitchFamily="34" charset="0"/>
-              <a:buChar char="•"/>
-              <a:defRPr sz="1800" kern="1200">
-                <a:solidFill>
-                  <a:schemeClr val="tx1"/>
-                </a:solidFill>
-                <a:latin typeface="+mn-lt"/>
-                <a:ea typeface="+mn-ea"/>
-                <a:cs typeface="+mn-cs"/>
-              </a:defRPr>
-            </a:lvl4pPr>
-            <a:lvl5pPr marL="2057400" indent="-228600" algn="l" defTabSz="914400" rtl="0" eaLnBrk="1" latinLnBrk="0" hangingPunct="1">
-              <a:lnSpc>
-                <a:spcPct val="90000"/>
-              </a:lnSpc>
-              <a:spcBef>
-                <a:spcPts val="500"/>
-              </a:spcBef>
-              <a:buFont typeface="Arial" panose="020B0604020202020204" pitchFamily="34" charset="0"/>
-              <a:buChar char="•"/>
-              <a:defRPr sz="1800" kern="1200">
-                <a:solidFill>
-                  <a:schemeClr val="tx1"/>
-                </a:solidFill>
-                <a:latin typeface="+mn-lt"/>
-                <a:ea typeface="+mn-ea"/>
-                <a:cs typeface="+mn-cs"/>
-              </a:defRPr>
-            </a:lvl5pPr>
-            <a:lvl6pPr marL="2514600" indent="-228600" algn="l" defTabSz="914400" rtl="0" eaLnBrk="1" latinLnBrk="0" hangingPunct="1">
-              <a:lnSpc>
-                <a:spcPct val="90000"/>
-              </a:lnSpc>
-              <a:spcBef>
-                <a:spcPts val="500"/>
-              </a:spcBef>
-              <a:buFont typeface="Arial" panose="020B0604020202020204" pitchFamily="34" charset="0"/>
-              <a:buChar char="•"/>
-              <a:defRPr sz="1800" kern="1200">
-                <a:solidFill>
-                  <a:schemeClr val="tx1"/>
-                </a:solidFill>
-                <a:latin typeface="+mn-lt"/>
-                <a:ea typeface="+mn-ea"/>
-                <a:cs typeface="+mn-cs"/>
-              </a:defRPr>
-            </a:lvl6pPr>
-            <a:lvl7pPr marL="2971800" indent="-228600" algn="l" defTabSz="914400" rtl="0" eaLnBrk="1" latinLnBrk="0" hangingPunct="1">
-              <a:lnSpc>
-                <a:spcPct val="90000"/>
-              </a:lnSpc>
-              <a:spcBef>
-                <a:spcPts val="500"/>
-              </a:spcBef>
-              <a:buFont typeface="Arial" panose="020B0604020202020204" pitchFamily="34" charset="0"/>
-              <a:buChar char="•"/>
-              <a:defRPr sz="1800" kern="1200">
-                <a:solidFill>
-                  <a:schemeClr val="tx1"/>
-                </a:solidFill>
-                <a:latin typeface="+mn-lt"/>
-                <a:ea typeface="+mn-ea"/>
-                <a:cs typeface="+mn-cs"/>
-              </a:defRPr>
-            </a:lvl7pPr>
-            <a:lvl8pPr marL="3429000" indent="-228600" algn="l" defTabSz="914400" rtl="0" eaLnBrk="1" latinLnBrk="0" hangingPunct="1">
-              <a:lnSpc>
-                <a:spcPct val="90000"/>
-              </a:lnSpc>
-              <a:spcBef>
-                <a:spcPts val="500"/>
-              </a:spcBef>
-              <a:buFont typeface="Arial" panose="020B0604020202020204" pitchFamily="34" charset="0"/>
-              <a:buChar char="•"/>
-              <a:defRPr sz="1800" kern="1200">
-                <a:solidFill>
-                  <a:schemeClr val="tx1"/>
-                </a:solidFill>
-                <a:latin typeface="+mn-lt"/>
-                <a:ea typeface="+mn-ea"/>
-                <a:cs typeface="+mn-cs"/>
-              </a:defRPr>
-            </a:lvl8pPr>
-            <a:lvl9pPr marL="3886200" indent="-228600" algn="l" defTabSz="914400" rtl="0" eaLnBrk="1" latinLnBrk="0" hangingPunct="1">
-              <a:lnSpc>
-                <a:spcPct val="90000"/>
-              </a:lnSpc>
-              <a:spcBef>
-                <a:spcPts val="500"/>
-              </a:spcBef>
-              <a:buFont typeface="Arial" panose="020B0604020202020204" pitchFamily="34" charset="0"/>
-              <a:buChar char="•"/>
-              <a:defRPr sz="1800" kern="1200">
-                <a:solidFill>
-                  <a:schemeClr val="tx1"/>
-                </a:solidFill>
-                <a:latin typeface="+mn-lt"/>
-                <a:ea typeface="+mn-ea"/>
-                <a:cs typeface="+mn-cs"/>
-              </a:defRPr>
-            </a:lvl9pPr>
-          </a:lstStyle>
-          <a:p>
-            <a:pPr marL="0" indent="0">
-              <a:buFont typeface="Arial" panose="020B0604020202020204" pitchFamily="34" charset="0"/>
-              <a:buNone/>
-            </a:pPr>
-            <a:r>
-              <a:rPr lang="en-US" sz="2000" b="1" dirty="0"/>
-              <a:t>CSV-data</a:t>
-            </a:r>
-          </a:p>
-          <a:p>
-            <a:pPr marL="0" indent="0">
-              <a:buFont typeface="Arial" panose="020B0604020202020204" pitchFamily="34" charset="0"/>
-              <a:buNone/>
-            </a:pPr>
-            <a:endParaRPr lang="en-US" sz="2000" dirty="0"/>
-          </a:p>
-          <a:p>
-            <a:pPr marL="0" indent="0">
-              <a:buFont typeface="Arial" panose="020B0604020202020204" pitchFamily="34" charset="0"/>
-              <a:buNone/>
-            </a:pPr>
-            <a:r>
-              <a:rPr lang="en-US" sz="2000" dirty="0"/>
-              <a:t>Henk,man,44</a:t>
-            </a:r>
-          </a:p>
-          <a:p>
-            <a:pPr marL="0" indent="0">
-              <a:buFont typeface="Arial" panose="020B0604020202020204" pitchFamily="34" charset="0"/>
-              <a:buNone/>
-            </a:pPr>
-            <a:r>
-              <a:rPr lang="en-US" sz="2000" dirty="0"/>
-              <a:t>Ingrid,vrouw,37</a:t>
-            </a:r>
-          </a:p>
-          <a:p>
-            <a:pPr marL="0" indent="0">
-              <a:buFont typeface="Arial" panose="020B0604020202020204" pitchFamily="34" charset="0"/>
-              <a:buNone/>
-            </a:pPr>
-            <a:r>
-              <a:rPr lang="en-US" sz="2000" dirty="0"/>
-              <a:t>Jaap,man,56</a:t>
-            </a:r>
-          </a:p>
-          <a:p>
-            <a:pPr marL="0" indent="0">
-              <a:buFont typeface="Arial" panose="020B0604020202020204" pitchFamily="34" charset="0"/>
-              <a:buNone/>
-            </a:pPr>
-            <a:endParaRPr lang="en-US" sz="2000" dirty="0"/>
-          </a:p>
-        </p:txBody>
-      </p:sp>
-      <p:cxnSp>
-        <p:nvCxnSpPr>
-          <p:cNvPr id="6" name="Straight Connector 5">
-            <a:extLst>
-              <a:ext uri="{FF2B5EF4-FFF2-40B4-BE49-F238E27FC236}">
-                <a16:creationId xmlns:a16="http://schemas.microsoft.com/office/drawing/2014/main" id="{F76A5445-2474-58A8-F1AE-18BB279DAEAF}"/>
-              </a:ext>
-            </a:extLst>
-          </p:cNvPr>
-          <p:cNvCxnSpPr/>
-          <p:nvPr/>
-        </p:nvCxnSpPr>
-        <p:spPr>
-          <a:xfrm>
-            <a:off x="7772400" y="1456267"/>
-            <a:ext cx="0" cy="4720696"/>
-          </a:xfrm>
-          <a:prstGeom prst="line">
-            <a:avLst/>
-          </a:prstGeom>
-        </p:spPr>
-        <p:style>
-          <a:lnRef idx="3">
-            <a:schemeClr val="dk1"/>
-          </a:lnRef>
-          <a:fillRef idx="0">
-            <a:schemeClr val="dk1"/>
-          </a:fillRef>
-          <a:effectRef idx="2">
-            <a:schemeClr val="dk1"/>
-          </a:effectRef>
-          <a:fontRef idx="minor">
-            <a:schemeClr val="tx1"/>
-          </a:fontRef>
-        </p:style>
-      </p:cxnSp>
-    </p:spTree>
-    <p:extLst>
-      <p:ext uri="{BB962C8B-B14F-4D97-AF65-F5344CB8AC3E}">
-        <p14:creationId xmlns:p14="http://schemas.microsoft.com/office/powerpoint/2010/main" val="2639598204"/>
-      </p:ext>
-    </p:extLst>
-  </p:cSld>
-  <p:clrMapOvr>
-    <a:masterClrMapping/>
-  </p:clrMapOvr>
-</p:sld>
-</file>
-
 <file path=ppt/slides/slide4.xml><?xml version="1.0" encoding="utf-8"?>
 <p:sld xmlns:a="http://schemas.openxmlformats.org/drawingml/2006/main" xmlns:r="http://schemas.openxmlformats.org/officeDocument/2006/relationships" xmlns:p="http://schemas.openxmlformats.org/presentationml/2006/main">
   <p:cSld>

</xml_diff>